<commit_message>
Update lecture 03B slides.
</commit_message>
<xml_diff>
--- a/bishops/cs321/resources/CS321_Lecture_03B.pptx
+++ b/bishops/cs321/resources/CS321_Lecture_03B.pptx
@@ -227,7 +227,7 @@
           <a:p>
             <a:fld id="{A6583E9D-07AB-4C6D-BFD0-47E805C6B3D4}" type="datetimeFigureOut">
               <a:rPr lang="en-CA" smtClean="0"/>
-              <a:t>2022-01-19</a:t>
+              <a:t>2022-01-21</a:t>
             </a:fld>
             <a:endParaRPr lang="en-CA"/>
           </a:p>
@@ -27640,7 +27640,19 @@
               <a:rPr lang="en-GB" altLang="en-US" sz="1800" dirty="0">
                 <a:latin typeface="Courier" pitchFamily="64" charset="0"/>
               </a:rPr>
-              <a:t>     int[][] result = zip(a1, a2);</a:t>
+              <a:t>     int[][] result = </a:t>
+            </a:r>
+            <a:r>
+              <a:rPr lang="en-GB" altLang="en-US" sz="1800" dirty="0" err="1">
+                <a:latin typeface="Courier" pitchFamily="64" charset="0"/>
+              </a:rPr>
+              <a:t>zipAndFlip</a:t>
+            </a:r>
+            <a:r>
+              <a:rPr lang="en-GB" altLang="en-US" sz="1800" dirty="0">
+                <a:latin typeface="Courier" pitchFamily="64" charset="0"/>
+              </a:rPr>
+              <a:t>(a1, a2);</a:t>
             </a:r>
           </a:p>
           <a:p>

</xml_diff>